<commit_message>
Filled in remaining slides of presentation
</commit_message>
<xml_diff>
--- a/Weekly Report Template.pptx
+++ b/Weekly Report Template.pptx
@@ -110,6 +110,11 @@
       </a:defRPr>
     </a:lvl9pPr>
   </p:defaultTextStyle>
+  <p:extLst>
+    <p:ext uri="{EFAFB233-063F-42B5-8137-9DF3F51BA10A}">
+      <p15:sldGuideLst xmlns:p15="http://schemas.microsoft.com/office/powerpoint/2012/main"/>
+    </p:ext>
+  </p:extLst>
 </p:presentation>
 </file>
 
@@ -260,7 +265,7 @@
           <a:p>
             <a:fld id="{AED2395A-C272-E84D-AD2E-65B05DB564FF}" type="datetimeFigureOut">
               <a:rPr lang="en-US" smtClean="0"/>
-              <a:t>11/10/21</a:t>
+              <a:t>11/11/2021</a:t>
             </a:fld>
             <a:endParaRPr lang="en-US"/>
           </a:p>
@@ -458,7 +463,7 @@
           <a:p>
             <a:fld id="{AED2395A-C272-E84D-AD2E-65B05DB564FF}" type="datetimeFigureOut">
               <a:rPr lang="en-US" smtClean="0"/>
-              <a:t>11/10/21</a:t>
+              <a:t>11/11/2021</a:t>
             </a:fld>
             <a:endParaRPr lang="en-US"/>
           </a:p>
@@ -666,7 +671,7 @@
           <a:p>
             <a:fld id="{AED2395A-C272-E84D-AD2E-65B05DB564FF}" type="datetimeFigureOut">
               <a:rPr lang="en-US" smtClean="0"/>
-              <a:t>11/10/21</a:t>
+              <a:t>11/11/2021</a:t>
             </a:fld>
             <a:endParaRPr lang="en-US"/>
           </a:p>
@@ -864,7 +869,7 @@
           <a:p>
             <a:fld id="{AED2395A-C272-E84D-AD2E-65B05DB564FF}" type="datetimeFigureOut">
               <a:rPr lang="en-US" smtClean="0"/>
-              <a:t>11/10/21</a:t>
+              <a:t>11/11/2021</a:t>
             </a:fld>
             <a:endParaRPr lang="en-US"/>
           </a:p>
@@ -1139,7 +1144,7 @@
           <a:p>
             <a:fld id="{AED2395A-C272-E84D-AD2E-65B05DB564FF}" type="datetimeFigureOut">
               <a:rPr lang="en-US" smtClean="0"/>
-              <a:t>11/10/21</a:t>
+              <a:t>11/11/2021</a:t>
             </a:fld>
             <a:endParaRPr lang="en-US"/>
           </a:p>
@@ -1404,7 +1409,7 @@
           <a:p>
             <a:fld id="{AED2395A-C272-E84D-AD2E-65B05DB564FF}" type="datetimeFigureOut">
               <a:rPr lang="en-US" smtClean="0"/>
-              <a:t>11/10/21</a:t>
+              <a:t>11/11/2021</a:t>
             </a:fld>
             <a:endParaRPr lang="en-US"/>
           </a:p>
@@ -1816,7 +1821,7 @@
           <a:p>
             <a:fld id="{AED2395A-C272-E84D-AD2E-65B05DB564FF}" type="datetimeFigureOut">
               <a:rPr lang="en-US" smtClean="0"/>
-              <a:t>11/10/21</a:t>
+              <a:t>11/11/2021</a:t>
             </a:fld>
             <a:endParaRPr lang="en-US"/>
           </a:p>
@@ -1957,7 +1962,7 @@
           <a:p>
             <a:fld id="{AED2395A-C272-E84D-AD2E-65B05DB564FF}" type="datetimeFigureOut">
               <a:rPr lang="en-US" smtClean="0"/>
-              <a:t>11/10/21</a:t>
+              <a:t>11/11/2021</a:t>
             </a:fld>
             <a:endParaRPr lang="en-US"/>
           </a:p>
@@ -2070,7 +2075,7 @@
           <a:p>
             <a:fld id="{AED2395A-C272-E84D-AD2E-65B05DB564FF}" type="datetimeFigureOut">
               <a:rPr lang="en-US" smtClean="0"/>
-              <a:t>11/10/21</a:t>
+              <a:t>11/11/2021</a:t>
             </a:fld>
             <a:endParaRPr lang="en-US"/>
           </a:p>
@@ -2381,7 +2386,7 @@
           <a:p>
             <a:fld id="{AED2395A-C272-E84D-AD2E-65B05DB564FF}" type="datetimeFigureOut">
               <a:rPr lang="en-US" smtClean="0"/>
-              <a:t>11/10/21</a:t>
+              <a:t>11/11/2021</a:t>
             </a:fld>
             <a:endParaRPr lang="en-US"/>
           </a:p>
@@ -2669,7 +2674,7 @@
           <a:p>
             <a:fld id="{AED2395A-C272-E84D-AD2E-65B05DB564FF}" type="datetimeFigureOut">
               <a:rPr lang="en-US" smtClean="0"/>
-              <a:t>11/10/21</a:t>
+              <a:t>11/11/2021</a:t>
             </a:fld>
             <a:endParaRPr lang="en-US"/>
           </a:p>
@@ -2910,7 +2915,7 @@
           <a:p>
             <a:fld id="{AED2395A-C272-E84D-AD2E-65B05DB564FF}" type="datetimeFigureOut">
               <a:rPr lang="en-US" smtClean="0"/>
-              <a:t>11/10/21</a:t>
+              <a:t>11/11/2021</a:t>
             </a:fld>
             <a:endParaRPr lang="en-US"/>
           </a:p>
@@ -3817,7 +3822,7 @@
         <p:spPr/>
         <p:txBody>
           <a:bodyPr>
-            <a:normAutofit/>
+            <a:normAutofit lnSpcReduction="10000"/>
           </a:bodyPr>
           <a:lstStyle/>
           <a:p>
@@ -3827,12 +3832,23 @@
             </a:r>
           </a:p>
           <a:p>
-            <a:endParaRPr lang="en-US" dirty="0"/>
-          </a:p>
-          <a:p>
-            <a:endParaRPr lang="en-US" dirty="0"/>
-          </a:p>
-          <a:p>
+            <a:pPr lvl="1"/>
+            <a:r>
+              <a:rPr lang="en-US" dirty="0"/>
+              <a:t>After initial success using a workaround in Python, we ran into further troubles with too many API calls (resulting in the webpage blocking our IP address).</a:t>
+            </a:r>
+          </a:p>
+          <a:p>
+            <a:pPr lvl="1"/>
+            <a:r>
+              <a:rPr lang="en-US" dirty="0"/>
+              <a:t>The website allows access again after a few hours, so a final attempt will be made to scrape the page by pausing the loop after each run. If this attempt is unsuccessful, we will resort fully to OCR/working with a sample the image files. </a:t>
+            </a:r>
+          </a:p>
+          <a:p>
+            <a:pPr marL="0" indent="0">
+              <a:buNone/>
+            </a:pPr>
             <a:endParaRPr lang="en-US" dirty="0"/>
           </a:p>
           <a:p>
@@ -3968,7 +3984,13 @@
           <a:p>
             <a:r>
               <a:rPr lang="en-US" dirty="0"/>
-              <a:t>Image cropping</a:t>
+              <a:t>Webpage blocks our IP address for several hours after scraping attempt.</a:t>
+            </a:r>
+          </a:p>
+          <a:p>
+            <a:r>
+              <a:rPr lang="en-US" dirty="0"/>
+              <a:t>Image cropping has proved difficult (but not impossible) due to the inconsistency between ad pages.</a:t>
             </a:r>
           </a:p>
         </p:txBody>
@@ -4060,7 +4082,29 @@
           <a:bodyPr/>
           <a:lstStyle/>
           <a:p>
-            <a:endParaRPr lang="en-US"/>
+            <a:r>
+              <a:rPr lang="en-US" dirty="0"/>
+              <a:t>Attempt to scrape the webpage a final time by pausing the system in between iterations.</a:t>
+            </a:r>
+          </a:p>
+          <a:p>
+            <a:r>
+              <a:rPr lang="en-US" dirty="0"/>
+              <a:t>If this fails, grab a sample of image files from October – December of each year.</a:t>
+            </a:r>
+          </a:p>
+          <a:p>
+            <a:pPr lvl="1"/>
+            <a:r>
+              <a:rPr lang="en-US" dirty="0"/>
+              <a:t>Look at holiday trends</a:t>
+            </a:r>
+          </a:p>
+          <a:p>
+            <a:r>
+              <a:rPr lang="en-US" dirty="0"/>
+              <a:t>Improve image cropping to locate correct elements of the image files.</a:t>
+            </a:r>
           </a:p>
         </p:txBody>
       </p:sp>

</xml_diff>

<commit_message>
Added crop notes to PowerPoint and my OCR Test file
</commit_message>
<xml_diff>
--- a/Weekly Report Template.pptx
+++ b/Weekly Report Template.pptx
@@ -9,9 +9,11 @@
     <p:sldId id="257" r:id="rId3"/>
     <p:sldId id="259" r:id="rId4"/>
     <p:sldId id="258" r:id="rId5"/>
-    <p:sldId id="260" r:id="rId6"/>
-    <p:sldId id="261" r:id="rId7"/>
-    <p:sldId id="262" r:id="rId8"/>
+    <p:sldId id="264" r:id="rId6"/>
+    <p:sldId id="263" r:id="rId7"/>
+    <p:sldId id="260" r:id="rId8"/>
+    <p:sldId id="261" r:id="rId9"/>
+    <p:sldId id="262" r:id="rId10"/>
   </p:sldIdLst>
   <p:sldSz cx="12192000" cy="6858000"/>
   <p:notesSz cx="6858000" cy="9144000"/>
@@ -3938,7 +3940,7 @@
           <p:cNvPr id="2" name="Title 1">
             <a:extLst>
               <a:ext uri="{FF2B5EF4-FFF2-40B4-BE49-F238E27FC236}">
-                <a16:creationId xmlns:a16="http://schemas.microsoft.com/office/drawing/2014/main" id="{4FD1942D-2559-DD45-B87B-38748BFE2C71}"/>
+                <a16:creationId xmlns:a16="http://schemas.microsoft.com/office/drawing/2014/main" id="{CA5F2AB6-C2ED-5743-A8C9-2C99F511D7B7}"/>
               </a:ext>
             </a:extLst>
           </p:cNvPr>
@@ -3956,17 +3958,17 @@
           <a:p>
             <a:r>
               <a:rPr lang="en-US" dirty="0"/>
-              <a:t>Current Challenges </a:t>
-            </a:r>
-          </a:p>
-        </p:txBody>
-      </p:sp>
-      <p:sp>
-        <p:nvSpPr>
-          <p:cNvPr id="3" name="Content Placeholder 2">
-            <a:extLst>
-              <a:ext uri="{FF2B5EF4-FFF2-40B4-BE49-F238E27FC236}">
-                <a16:creationId xmlns:a16="http://schemas.microsoft.com/office/drawing/2014/main" id="{580C7FDC-262C-AF45-A868-6023771F1225}"/>
+              <a:t>Image Cropping Example</a:t>
+            </a:r>
+          </a:p>
+        </p:txBody>
+      </p:sp>
+      <p:sp>
+        <p:nvSpPr>
+          <p:cNvPr id="4" name="Content Placeholder 3">
+            <a:extLst>
+              <a:ext uri="{FF2B5EF4-FFF2-40B4-BE49-F238E27FC236}">
+                <a16:creationId xmlns:a16="http://schemas.microsoft.com/office/drawing/2014/main" id="{3449436E-F82E-E447-9F04-394F1D2D9279}"/>
               </a:ext>
             </a:extLst>
           </p:cNvPr>
@@ -3977,28 +3979,326 @@
             <p:ph idx="1"/>
           </p:nvPr>
         </p:nvSpPr>
-        <p:spPr/>
-        <p:txBody>
-          <a:bodyPr/>
-          <a:lstStyle/>
-          <a:p>
-            <a:r>
-              <a:rPr lang="en-US" dirty="0"/>
-              <a:t>Webpage blocks our IP address for several hours after scraping attempt.</a:t>
-            </a:r>
-          </a:p>
-          <a:p>
-            <a:r>
-              <a:rPr lang="en-US" dirty="0"/>
-              <a:t>Image cropping has proved difficult (but not impossible) due to the inconsistency between ad pages.</a:t>
-            </a:r>
+        <p:spPr>
+          <a:xfrm>
+            <a:off x="385713" y="1825624"/>
+            <a:ext cx="10515600" cy="5032375"/>
+          </a:xfrm>
+        </p:spPr>
+        <p:txBody>
+          <a:bodyPr>
+            <a:normAutofit/>
+          </a:bodyPr>
+          <a:lstStyle/>
+          <a:p>
+            <a:pPr marL="0" indent="0">
+              <a:buNone/>
+            </a:pPr>
+            <a:r>
+              <a:rPr lang="en-US" sz="1600" dirty="0"/>
+              <a:t>EDUCED SF, col REY: ; Cheerios</a:t>
+            </a:r>
+          </a:p>
+          <a:p>
+            <a:pPr marL="0" indent="0">
+              <a:buNone/>
+            </a:pPr>
+            <a:r>
+              <a:rPr lang="en-US" sz="1600" dirty="0" err="1"/>
+              <a:t>Bigtruas</a:t>
+            </a:r>
+            <a:r>
+              <a:rPr lang="en-US" sz="1600" dirty="0"/>
+              <a:t> — 10FBRns psoas GH Fee , </a:t>
+            </a:r>
+            <a:r>
+              <a:rPr lang="en-US" sz="1600" dirty="0" err="1"/>
+              <a:t>ie</a:t>
+            </a:r>
+            <a:r>
+              <a:rPr lang="en-US" sz="1600" dirty="0"/>
+              <a:t> om</a:t>
+            </a:r>
+          </a:p>
+          <a:p>
+            <a:pPr marL="0" indent="0">
+              <a:buNone/>
+            </a:pPr>
+            <a:r>
+              <a:rPr lang="en-US" sz="1600" dirty="0" err="1"/>
+              <a:t>aaa</a:t>
+            </a:r>
+            <a:r>
+              <a:rPr lang="en-US" sz="1600" dirty="0"/>
+              <a:t> . = S EB</a:t>
+            </a:r>
+          </a:p>
+          <a:p>
+            <a:pPr marL="0" indent="0">
+              <a:buNone/>
+            </a:pPr>
+            <a:r>
+              <a:rPr lang="en-US" sz="1600" dirty="0" err="1"/>
+              <a:t>ol</a:t>
+            </a:r>
+            <a:r>
+              <a:rPr lang="en-US" sz="1600" dirty="0"/>
+              <a:t> |g | </a:t>
+            </a:r>
+            <a:r>
+              <a:rPr lang="en-US" sz="1600" dirty="0" err="1"/>
+              <a:t>Ei</a:t>
+            </a:r>
+            <a:r>
+              <a:rPr lang="en-US" sz="1600" dirty="0"/>
+              <a:t> | acre</a:t>
+            </a:r>
+          </a:p>
+          <a:p>
+            <a:pPr marL="0" indent="0">
+              <a:buNone/>
+            </a:pPr>
+            <a:r>
+              <a:rPr lang="en-US" sz="1600" dirty="0" err="1"/>
+              <a:t>sae</a:t>
+            </a:r>
+            <a:r>
+              <a:rPr lang="en-US" sz="1600" dirty="0"/>
+              <a:t> </a:t>
+            </a:r>
+            <a:r>
+              <a:rPr lang="en-US" sz="1600" dirty="0" err="1"/>
+              <a:t>sn</a:t>
+            </a:r>
+            <a:r>
+              <a:rPr lang="en-US" sz="1600" dirty="0"/>
+              <a:t> | j </a:t>
+            </a:r>
+            <a:r>
+              <a:rPr lang="en-US" sz="1600" dirty="0" err="1"/>
+              <a:t>ee</a:t>
+            </a:r>
+            <a:r>
+              <a:rPr lang="en-US" sz="1600" dirty="0"/>
+              <a:t> 5 </a:t>
+            </a:r>
+            <a:r>
+              <a:rPr lang="en-US" sz="1600" dirty="0" err="1"/>
+              <a:t>bie</a:t>
+            </a:r>
+            <a:endParaRPr lang="en-US" sz="1600" dirty="0"/>
+          </a:p>
+          <a:p>
+            <a:pPr marL="0" indent="0">
+              <a:buNone/>
+            </a:pPr>
+            <a:r>
+              <a:rPr lang="en-US" sz="1600" dirty="0">
+                <a:solidFill>
+                  <a:srgbClr val="FF0000"/>
+                </a:solidFill>
+              </a:rPr>
+              <a:t>Old El Paso® 8-10 </a:t>
+            </a:r>
+            <a:r>
+              <a:rPr lang="en-US" sz="1600" dirty="0" err="1">
+                <a:solidFill>
+                  <a:srgbClr val="FF0000"/>
+                </a:solidFill>
+              </a:rPr>
+              <a:t>ct</a:t>
+            </a:r>
+            <a:r>
+              <a:rPr lang="en-US" sz="1600" dirty="0">
+                <a:solidFill>
+                  <a:srgbClr val="FF0000"/>
+                </a:solidFill>
+              </a:rPr>
+              <a:t>: Flour </a:t>
+            </a:r>
+            <a:r>
+              <a:rPr lang="en-US" sz="1600" dirty="0"/>
+              <a:t>Old El Paso® Original Taco Kraft® 7.25 oz. =</a:t>
+            </a:r>
+          </a:p>
+          <a:p>
+            <a:pPr marL="0" indent="0">
+              <a:buNone/>
+            </a:pPr>
+            <a:r>
+              <a:rPr lang="en-US" sz="1600" dirty="0"/>
+              <a:t>; “ </a:t>
+            </a:r>
+            <a:r>
+              <a:rPr lang="en-US" sz="1600" dirty="0" err="1"/>
+              <a:t>ee</a:t>
+            </a:r>
+            <a:r>
+              <a:rPr lang="en-US" sz="1600" dirty="0"/>
+              <a:t> Seasoning, 6.25 oz. Macaroni &amp; Cheese General Mills®</a:t>
+            </a:r>
+          </a:p>
+          <a:p>
+            <a:pPr marL="0" indent="0">
+              <a:buNone/>
+            </a:pPr>
+            <a:r>
+              <a:rPr lang="en-US" sz="1600" dirty="0">
+                <a:solidFill>
+                  <a:srgbClr val="FF0000"/>
+                </a:solidFill>
+              </a:rPr>
+              <a:t>‘SAVE 390, </a:t>
+            </a:r>
+            <a:r>
+              <a:rPr lang="en-US" sz="1600" dirty="0"/>
+              <a:t>SAVE 50% SAVE &gt;: or Cheerios™ Cereal, 8.9 oz.</a:t>
+            </a:r>
+          </a:p>
+          <a:p>
+            <a:pPr marL="0" indent="0">
+              <a:buNone/>
+            </a:pPr>
+            <a:r>
+              <a:rPr lang="en-US" sz="1600" dirty="0"/>
+              <a:t>SAVE °</a:t>
+            </a:r>
+          </a:p>
+          <a:p>
+            <a:pPr marL="0" indent="0">
+              <a:buNone/>
+            </a:pPr>
+            <a:r>
+              <a:rPr lang="en-US" sz="1600" dirty="0"/>
+              <a:t>° 37% 38%</a:t>
+            </a:r>
+          </a:p>
+          <a:p>
+            <a:pPr marL="0" indent="0">
+              <a:buNone/>
+            </a:pPr>
+            <a:r>
+              <a:rPr lang="en-US" sz="1600" dirty="0"/>
+              <a:t>d=</a:t>
+            </a:r>
+          </a:p>
+          <a:p>
+            <a:pPr marL="0" indent="0">
+              <a:buNone/>
+            </a:pPr>
+            <a:r>
+              <a:rPr lang="en-US" sz="1600" dirty="0"/>
+              <a:t>are bd in wee</a:t>
+            </a:r>
+          </a:p>
+          <a:p>
+            <a:pPr marL="0" indent="0">
+              <a:buNone/>
+            </a:pPr>
+            <a:r>
+              <a:rPr lang="en-US" sz="1600" dirty="0" err="1"/>
+              <a:t>ewan</a:t>
+            </a:r>
+            <a:r>
+              <a:rPr lang="en-US" sz="1600" dirty="0"/>
+              <a:t>} SST = of Na.</a:t>
+            </a:r>
+          </a:p>
+          <a:p>
+            <a:pPr marL="0" indent="0">
+              <a:buNone/>
+            </a:pPr>
+            <a:r>
+              <a:rPr lang="en-US" sz="1600" dirty="0">
+                <a:solidFill>
+                  <a:srgbClr val="FF0000"/>
+                </a:solidFill>
+              </a:rPr>
+              <a:t>Where did the “Tortillas, Select Varieties” go?</a:t>
+            </a:r>
+          </a:p>
+        </p:txBody>
+      </p:sp>
+      <p:pic>
+        <p:nvPicPr>
+          <p:cNvPr id="6" name="Picture 5" descr="A picture containing timeline&#10;&#10;Description automatically generated">
+            <a:extLst>
+              <a:ext uri="{FF2B5EF4-FFF2-40B4-BE49-F238E27FC236}">
+                <a16:creationId xmlns:a16="http://schemas.microsoft.com/office/drawing/2014/main" id="{A00B87BE-F2B6-49E3-9E97-0B90F33354EC}"/>
+              </a:ext>
+            </a:extLst>
+          </p:cNvPr>
+          <p:cNvPicPr>
+            <a:picLocks noChangeAspect="1"/>
+          </p:cNvPicPr>
+          <p:nvPr/>
+        </p:nvPicPr>
+        <p:blipFill>
+          <a:blip r:embed="rId2"/>
+          <a:stretch>
+            <a:fillRect/>
+          </a:stretch>
+        </p:blipFill>
+        <p:spPr>
+          <a:xfrm>
+            <a:off x="6892837" y="0"/>
+            <a:ext cx="5299163" cy="6858000"/>
+          </a:xfrm>
+          <a:prstGeom prst="rect">
+            <a:avLst/>
+          </a:prstGeom>
+        </p:spPr>
+      </p:pic>
+      <p:sp>
+        <p:nvSpPr>
+          <p:cNvPr id="8" name="Arrow: Right 7">
+            <a:extLst>
+              <a:ext uri="{FF2B5EF4-FFF2-40B4-BE49-F238E27FC236}">
+                <a16:creationId xmlns:a16="http://schemas.microsoft.com/office/drawing/2014/main" id="{AD281F14-3E00-4C80-8FC7-AB896A9C9528}"/>
+              </a:ext>
+            </a:extLst>
+          </p:cNvPr>
+          <p:cNvSpPr/>
+          <p:nvPr/>
+        </p:nvSpPr>
+        <p:spPr>
+          <a:xfrm>
+            <a:off x="5901179" y="1690688"/>
+            <a:ext cx="1376314" cy="1005378"/>
+          </a:xfrm>
+          <a:prstGeom prst="rightArrow">
+            <a:avLst/>
+          </a:prstGeom>
+        </p:spPr>
+        <p:style>
+          <a:lnRef idx="2">
+            <a:schemeClr val="accent2">
+              <a:shade val="50000"/>
+            </a:schemeClr>
+          </a:lnRef>
+          <a:fillRef idx="1">
+            <a:schemeClr val="accent2"/>
+          </a:fillRef>
+          <a:effectRef idx="0">
+            <a:schemeClr val="accent2"/>
+          </a:effectRef>
+          <a:fontRef idx="minor">
+            <a:schemeClr val="lt1"/>
+          </a:fontRef>
+        </p:style>
+        <p:txBody>
+          <a:bodyPr rtlCol="0" anchor="ctr"/>
+          <a:lstStyle/>
+          <a:p>
+            <a:pPr algn="ctr"/>
+            <a:endParaRPr lang="en-US"/>
           </a:p>
         </p:txBody>
       </p:sp>
     </p:spTree>
     <p:extLst>
       <p:ext uri="{BB962C8B-B14F-4D97-AF65-F5344CB8AC3E}">
-        <p14:creationId xmlns:p14="http://schemas.microsoft.com/office/powerpoint/2010/main" val="3681003705"/>
+        <p14:creationId xmlns:p14="http://schemas.microsoft.com/office/powerpoint/2010/main" val="3044469165"/>
       </p:ext>
     </p:extLst>
   </p:cSld>
@@ -4038,6 +4338,390 @@
           <p:cNvPr id="2" name="Title 1">
             <a:extLst>
               <a:ext uri="{FF2B5EF4-FFF2-40B4-BE49-F238E27FC236}">
+                <a16:creationId xmlns:a16="http://schemas.microsoft.com/office/drawing/2014/main" id="{CA5F2AB6-C2ED-5743-A8C9-2C99F511D7B7}"/>
+              </a:ext>
+            </a:extLst>
+          </p:cNvPr>
+          <p:cNvSpPr>
+            <a:spLocks noGrp="1"/>
+          </p:cNvSpPr>
+          <p:nvPr>
+            <p:ph type="title"/>
+          </p:nvPr>
+        </p:nvSpPr>
+        <p:spPr/>
+        <p:txBody>
+          <a:bodyPr/>
+          <a:lstStyle/>
+          <a:p>
+            <a:r>
+              <a:rPr lang="en-US" dirty="0"/>
+              <a:t>Image Cropping Example</a:t>
+            </a:r>
+          </a:p>
+        </p:txBody>
+      </p:sp>
+      <p:sp>
+        <p:nvSpPr>
+          <p:cNvPr id="4" name="Content Placeholder 3">
+            <a:extLst>
+              <a:ext uri="{FF2B5EF4-FFF2-40B4-BE49-F238E27FC236}">
+                <a16:creationId xmlns:a16="http://schemas.microsoft.com/office/drawing/2014/main" id="{3449436E-F82E-E447-9F04-394F1D2D9279}"/>
+              </a:ext>
+            </a:extLst>
+          </p:cNvPr>
+          <p:cNvSpPr>
+            <a:spLocks noGrp="1"/>
+          </p:cNvSpPr>
+          <p:nvPr>
+            <p:ph idx="1"/>
+          </p:nvPr>
+        </p:nvSpPr>
+        <p:spPr/>
+        <p:txBody>
+          <a:bodyPr>
+            <a:normAutofit lnSpcReduction="10000"/>
+          </a:bodyPr>
+          <a:lstStyle/>
+          <a:p>
+            <a:pPr marL="0" indent="0">
+              <a:buNone/>
+            </a:pPr>
+            <a:r>
+              <a:rPr lang="en-US" sz="2000" dirty="0"/>
+              <a:t>a1 &lt;- </a:t>
+            </a:r>
+            <a:r>
+              <a:rPr lang="en-US" sz="2000" dirty="0" err="1"/>
+              <a:t>image_crop</a:t>
+            </a:r>
+            <a:r>
+              <a:rPr lang="en-US" sz="2000" dirty="0"/>
+              <a:t>(</a:t>
+            </a:r>
+            <a:r>
+              <a:rPr lang="en-US" sz="2000" dirty="0" err="1"/>
+              <a:t>ad_test</a:t>
+            </a:r>
+            <a:r>
+              <a:rPr lang="en-US" sz="2000" dirty="0"/>
+              <a:t>, geometry = </a:t>
+            </a:r>
+            <a:r>
+              <a:rPr lang="en-US" sz="2000" dirty="0" err="1"/>
+              <a:t>geometry_area</a:t>
+            </a:r>
+            <a:r>
+              <a:rPr lang="en-US" sz="2000" dirty="0"/>
+              <a:t>(width = 300,</a:t>
+            </a:r>
+          </a:p>
+          <a:p>
+            <a:pPr marL="0" indent="0">
+              <a:buNone/>
+            </a:pPr>
+            <a:r>
+              <a:rPr lang="en-US" sz="2000" dirty="0"/>
+              <a:t>				   	                   height = 150,</a:t>
+            </a:r>
+          </a:p>
+          <a:p>
+            <a:pPr marL="0" indent="0">
+              <a:buNone/>
+            </a:pPr>
+            <a:r>
+              <a:rPr lang="en-US" sz="2000" dirty="0"/>
+              <a:t>	             					   </a:t>
+            </a:r>
+            <a:r>
+              <a:rPr lang="en-US" sz="2000" dirty="0" err="1"/>
+              <a:t>x_off</a:t>
+            </a:r>
+            <a:r>
+              <a:rPr lang="en-US" sz="2000" dirty="0"/>
+              <a:t> = 50,</a:t>
+            </a:r>
+          </a:p>
+          <a:p>
+            <a:pPr marL="0" indent="0">
+              <a:buNone/>
+            </a:pPr>
+            <a:r>
+              <a:rPr lang="en-US" sz="2000" dirty="0"/>
+              <a:t>	             					   </a:t>
+            </a:r>
+            <a:r>
+              <a:rPr lang="en-US" sz="2000" dirty="0" err="1"/>
+              <a:t>y_off</a:t>
+            </a:r>
+            <a:r>
+              <a:rPr lang="en-US" sz="2000" dirty="0"/>
+              <a:t> = 590))</a:t>
+            </a:r>
+          </a:p>
+          <a:p>
+            <a:pPr marL="0" indent="0">
+              <a:buNone/>
+            </a:pPr>
+            <a:r>
+              <a:rPr lang="en-US" sz="2000" dirty="0"/>
+              <a:t>text_a1 &lt;- </a:t>
+            </a:r>
+            <a:r>
+              <a:rPr lang="en-US" sz="2000" dirty="0" err="1"/>
+              <a:t>ocr</a:t>
+            </a:r>
+            <a:r>
+              <a:rPr lang="en-US" sz="2000" dirty="0"/>
+              <a:t>(a1)</a:t>
+            </a:r>
+          </a:p>
+          <a:p>
+            <a:pPr marL="0" indent="0">
+              <a:buNone/>
+            </a:pPr>
+            <a:r>
+              <a:rPr lang="en-US" sz="2000" dirty="0"/>
+              <a:t>cat(text_a1)</a:t>
+            </a:r>
+          </a:p>
+          <a:p>
+            <a:pPr marL="0" indent="0">
+              <a:buNone/>
+            </a:pPr>
+            <a:endParaRPr lang="en-US" sz="2000" dirty="0"/>
+          </a:p>
+          <a:p>
+            <a:pPr marL="0" indent="0">
+              <a:buNone/>
+            </a:pPr>
+            <a:r>
+              <a:rPr lang="en-US" sz="2000" dirty="0"/>
+              <a:t>Old El Paso® 8 - 10 ct. Flour</a:t>
+            </a:r>
+          </a:p>
+          <a:p>
+            <a:pPr marL="0" indent="0">
+              <a:buNone/>
+            </a:pPr>
+            <a:r>
+              <a:rPr lang="en-US" sz="2000" dirty="0"/>
+              <a:t>Tortillas, Select Varieties</a:t>
+            </a:r>
+          </a:p>
+          <a:p>
+            <a:pPr marL="0" indent="0">
+              <a:buNone/>
+            </a:pPr>
+            <a:r>
+              <a:rPr lang="en-US" sz="2000" dirty="0"/>
+              <a:t>SAVE 9</a:t>
+            </a:r>
+          </a:p>
+          <a:p>
+            <a:pPr marL="0" indent="0">
+              <a:buNone/>
+            </a:pPr>
+            <a:r>
+              <a:rPr lang="en-US" sz="2000" dirty="0"/>
+              <a:t>39%</a:t>
+            </a:r>
+          </a:p>
+          <a:p>
+            <a:endParaRPr lang="en-US" dirty="0"/>
+          </a:p>
+        </p:txBody>
+      </p:sp>
+      <p:pic>
+        <p:nvPicPr>
+          <p:cNvPr id="1026" name="Picture 2">
+            <a:extLst>
+              <a:ext uri="{FF2B5EF4-FFF2-40B4-BE49-F238E27FC236}">
+                <a16:creationId xmlns:a16="http://schemas.microsoft.com/office/drawing/2014/main" id="{9ADD88EB-E98F-466A-8492-158C488543DA}"/>
+              </a:ext>
+            </a:extLst>
+          </p:cNvPr>
+          <p:cNvPicPr>
+            <a:picLocks noChangeAspect="1" noChangeArrowheads="1"/>
+          </p:cNvPicPr>
+          <p:nvPr/>
+        </p:nvPicPr>
+        <p:blipFill>
+          <a:blip r:embed="rId2">
+            <a:extLst>
+              <a:ext uri="{28A0092B-C50C-407E-A947-70E740481C1C}">
+                <a14:useLocalDpi xmlns:a14="http://schemas.microsoft.com/office/drawing/2010/main" val="0"/>
+              </a:ext>
+            </a:extLst>
+          </a:blip>
+          <a:srcRect/>
+          <a:stretch>
+            <a:fillRect/>
+          </a:stretch>
+        </p:blipFill>
+        <p:spPr bwMode="auto">
+          <a:xfrm>
+            <a:off x="8635935" y="1825625"/>
+            <a:ext cx="2857500" cy="1428750"/>
+          </a:xfrm>
+          <a:prstGeom prst="rect">
+            <a:avLst/>
+          </a:prstGeom>
+          <a:noFill/>
+          <a:extLst>
+            <a:ext uri="{909E8E84-426E-40DD-AFC4-6F175D3DCCD1}">
+              <a14:hiddenFill xmlns:a14="http://schemas.microsoft.com/office/drawing/2010/main">
+                <a:solidFill>
+                  <a:srgbClr val="FFFFFF"/>
+                </a:solidFill>
+              </a14:hiddenFill>
+            </a:ext>
+          </a:extLst>
+        </p:spPr>
+      </p:pic>
+    </p:spTree>
+    <p:extLst>
+      <p:ext uri="{BB962C8B-B14F-4D97-AF65-F5344CB8AC3E}">
+        <p14:creationId xmlns:p14="http://schemas.microsoft.com/office/powerpoint/2010/main" val="2996974391"/>
+      </p:ext>
+    </p:extLst>
+  </p:cSld>
+  <p:clrMapOvr>
+    <a:masterClrMapping/>
+  </p:clrMapOvr>
+</p:sld>
+</file>
+
+<file path=ppt/slides/slide7.xml><?xml version="1.0" encoding="utf-8"?>
+<p:sld xmlns:a="http://schemas.openxmlformats.org/drawingml/2006/main" xmlns:r="http://schemas.openxmlformats.org/officeDocument/2006/relationships" xmlns:p="http://schemas.openxmlformats.org/presentationml/2006/main">
+  <p:cSld>
+    <p:bg>
+      <p:bgPr>
+        <a:solidFill>
+          <a:schemeClr val="bg2"/>
+        </a:solidFill>
+        <a:effectLst/>
+      </p:bgPr>
+    </p:bg>
+    <p:spTree>
+      <p:nvGrpSpPr>
+        <p:cNvPr id="1" name=""/>
+        <p:cNvGrpSpPr/>
+        <p:nvPr/>
+      </p:nvGrpSpPr>
+      <p:grpSpPr>
+        <a:xfrm>
+          <a:off x="0" y="0"/>
+          <a:ext cx="0" cy="0"/>
+          <a:chOff x="0" y="0"/>
+          <a:chExt cx="0" cy="0"/>
+        </a:xfrm>
+      </p:grpSpPr>
+      <p:sp>
+        <p:nvSpPr>
+          <p:cNvPr id="2" name="Title 1">
+            <a:extLst>
+              <a:ext uri="{FF2B5EF4-FFF2-40B4-BE49-F238E27FC236}">
+                <a16:creationId xmlns:a16="http://schemas.microsoft.com/office/drawing/2014/main" id="{4FD1942D-2559-DD45-B87B-38748BFE2C71}"/>
+              </a:ext>
+            </a:extLst>
+          </p:cNvPr>
+          <p:cNvSpPr>
+            <a:spLocks noGrp="1"/>
+          </p:cNvSpPr>
+          <p:nvPr>
+            <p:ph type="title"/>
+          </p:nvPr>
+        </p:nvSpPr>
+        <p:spPr/>
+        <p:txBody>
+          <a:bodyPr/>
+          <a:lstStyle/>
+          <a:p>
+            <a:r>
+              <a:rPr lang="en-US" dirty="0"/>
+              <a:t>Current Challenges </a:t>
+            </a:r>
+          </a:p>
+        </p:txBody>
+      </p:sp>
+      <p:sp>
+        <p:nvSpPr>
+          <p:cNvPr id="3" name="Content Placeholder 2">
+            <a:extLst>
+              <a:ext uri="{FF2B5EF4-FFF2-40B4-BE49-F238E27FC236}">
+                <a16:creationId xmlns:a16="http://schemas.microsoft.com/office/drawing/2014/main" id="{580C7FDC-262C-AF45-A868-6023771F1225}"/>
+              </a:ext>
+            </a:extLst>
+          </p:cNvPr>
+          <p:cNvSpPr>
+            <a:spLocks noGrp="1"/>
+          </p:cNvSpPr>
+          <p:nvPr>
+            <p:ph idx="1"/>
+          </p:nvPr>
+        </p:nvSpPr>
+        <p:spPr/>
+        <p:txBody>
+          <a:bodyPr/>
+          <a:lstStyle/>
+          <a:p>
+            <a:r>
+              <a:rPr lang="en-US" dirty="0"/>
+              <a:t>Webpage blocks our IP address for several hours after scraping attempt.</a:t>
+            </a:r>
+          </a:p>
+          <a:p>
+            <a:r>
+              <a:rPr lang="en-US" dirty="0"/>
+              <a:t>Image cropping has proved difficult (but not impossible) due to the inconsistency between ad pages.</a:t>
+            </a:r>
+          </a:p>
+        </p:txBody>
+      </p:sp>
+    </p:spTree>
+    <p:extLst>
+      <p:ext uri="{BB962C8B-B14F-4D97-AF65-F5344CB8AC3E}">
+        <p14:creationId xmlns:p14="http://schemas.microsoft.com/office/powerpoint/2010/main" val="3681003705"/>
+      </p:ext>
+    </p:extLst>
+  </p:cSld>
+  <p:clrMapOvr>
+    <a:masterClrMapping/>
+  </p:clrMapOvr>
+</p:sld>
+</file>
+
+<file path=ppt/slides/slide8.xml><?xml version="1.0" encoding="utf-8"?>
+<p:sld xmlns:a="http://schemas.openxmlformats.org/drawingml/2006/main" xmlns:r="http://schemas.openxmlformats.org/officeDocument/2006/relationships" xmlns:p="http://schemas.openxmlformats.org/presentationml/2006/main">
+  <p:cSld>
+    <p:bg>
+      <p:bgPr>
+        <a:solidFill>
+          <a:schemeClr val="bg2"/>
+        </a:solidFill>
+        <a:effectLst/>
+      </p:bgPr>
+    </p:bg>
+    <p:spTree>
+      <p:nvGrpSpPr>
+        <p:cNvPr id="1" name=""/>
+        <p:cNvGrpSpPr/>
+        <p:nvPr/>
+      </p:nvGrpSpPr>
+      <p:grpSpPr>
+        <a:xfrm>
+          <a:off x="0" y="0"/>
+          <a:ext cx="0" cy="0"/>
+          <a:chOff x="0" y="0"/>
+          <a:chExt cx="0" cy="0"/>
+        </a:xfrm>
+      </p:grpSpPr>
+      <p:sp>
+        <p:nvSpPr>
+          <p:cNvPr id="2" name="Title 1">
+            <a:extLst>
+              <a:ext uri="{FF2B5EF4-FFF2-40B4-BE49-F238E27FC236}">
                 <a16:creationId xmlns:a16="http://schemas.microsoft.com/office/drawing/2014/main" id="{7AC5DE2A-6150-2E4E-9595-649FBF64DF5C}"/>
               </a:ext>
             </a:extLst>
@@ -4121,7 +4805,7 @@
 </p:sld>
 </file>
 
-<file path=ppt/slides/slide7.xml><?xml version="1.0" encoding="utf-8"?>
+<file path=ppt/slides/slide9.xml><?xml version="1.0" encoding="utf-8"?>
 <p:sld xmlns:a="http://schemas.openxmlformats.org/drawingml/2006/main" xmlns:r="http://schemas.openxmlformats.org/officeDocument/2006/relationships" xmlns:p="http://schemas.openxmlformats.org/presentationml/2006/main">
   <p:cSld>
     <p:bg>

</xml_diff>

<commit_message>
Added report template and last week's report
</commit_message>
<xml_diff>
--- a/Weekly Report Template.pptx
+++ b/Weekly Report Template.pptx
@@ -9,11 +9,9 @@
     <p:sldId id="257" r:id="rId3"/>
     <p:sldId id="259" r:id="rId4"/>
     <p:sldId id="258" r:id="rId5"/>
-    <p:sldId id="264" r:id="rId6"/>
-    <p:sldId id="263" r:id="rId7"/>
-    <p:sldId id="260" r:id="rId8"/>
-    <p:sldId id="261" r:id="rId9"/>
-    <p:sldId id="262" r:id="rId10"/>
+    <p:sldId id="260" r:id="rId6"/>
+    <p:sldId id="261" r:id="rId7"/>
+    <p:sldId id="262" r:id="rId8"/>
   </p:sldIdLst>
   <p:sldSz cx="12192000" cy="6858000"/>
   <p:notesSz cx="6858000" cy="9144000"/>
@@ -267,7 +265,7 @@
           <a:p>
             <a:fld id="{AED2395A-C272-E84D-AD2E-65B05DB564FF}" type="datetimeFigureOut">
               <a:rPr lang="en-US" smtClean="0"/>
-              <a:t>11/11/21</a:t>
+              <a:t>11/16/2021</a:t>
             </a:fld>
             <a:endParaRPr lang="en-US"/>
           </a:p>
@@ -465,7 +463,7 @@
           <a:p>
             <a:fld id="{AED2395A-C272-E84D-AD2E-65B05DB564FF}" type="datetimeFigureOut">
               <a:rPr lang="en-US" smtClean="0"/>
-              <a:t>11/11/21</a:t>
+              <a:t>11/16/2021</a:t>
             </a:fld>
             <a:endParaRPr lang="en-US"/>
           </a:p>
@@ -673,7 +671,7 @@
           <a:p>
             <a:fld id="{AED2395A-C272-E84D-AD2E-65B05DB564FF}" type="datetimeFigureOut">
               <a:rPr lang="en-US" smtClean="0"/>
-              <a:t>11/11/21</a:t>
+              <a:t>11/16/2021</a:t>
             </a:fld>
             <a:endParaRPr lang="en-US"/>
           </a:p>
@@ -871,7 +869,7 @@
           <a:p>
             <a:fld id="{AED2395A-C272-E84D-AD2E-65B05DB564FF}" type="datetimeFigureOut">
               <a:rPr lang="en-US" smtClean="0"/>
-              <a:t>11/11/21</a:t>
+              <a:t>11/16/2021</a:t>
             </a:fld>
             <a:endParaRPr lang="en-US"/>
           </a:p>
@@ -1146,7 +1144,7 @@
           <a:p>
             <a:fld id="{AED2395A-C272-E84D-AD2E-65B05DB564FF}" type="datetimeFigureOut">
               <a:rPr lang="en-US" smtClean="0"/>
-              <a:t>11/11/21</a:t>
+              <a:t>11/16/2021</a:t>
             </a:fld>
             <a:endParaRPr lang="en-US"/>
           </a:p>
@@ -1411,7 +1409,7 @@
           <a:p>
             <a:fld id="{AED2395A-C272-E84D-AD2E-65B05DB564FF}" type="datetimeFigureOut">
               <a:rPr lang="en-US" smtClean="0"/>
-              <a:t>11/11/21</a:t>
+              <a:t>11/16/2021</a:t>
             </a:fld>
             <a:endParaRPr lang="en-US"/>
           </a:p>
@@ -1823,7 +1821,7 @@
           <a:p>
             <a:fld id="{AED2395A-C272-E84D-AD2E-65B05DB564FF}" type="datetimeFigureOut">
               <a:rPr lang="en-US" smtClean="0"/>
-              <a:t>11/11/21</a:t>
+              <a:t>11/16/2021</a:t>
             </a:fld>
             <a:endParaRPr lang="en-US"/>
           </a:p>
@@ -1964,7 +1962,7 @@
           <a:p>
             <a:fld id="{AED2395A-C272-E84D-AD2E-65B05DB564FF}" type="datetimeFigureOut">
               <a:rPr lang="en-US" smtClean="0"/>
-              <a:t>11/11/21</a:t>
+              <a:t>11/16/2021</a:t>
             </a:fld>
             <a:endParaRPr lang="en-US"/>
           </a:p>
@@ -2077,7 +2075,7 @@
           <a:p>
             <a:fld id="{AED2395A-C272-E84D-AD2E-65B05DB564FF}" type="datetimeFigureOut">
               <a:rPr lang="en-US" smtClean="0"/>
-              <a:t>11/11/21</a:t>
+              <a:t>11/16/2021</a:t>
             </a:fld>
             <a:endParaRPr lang="en-US"/>
           </a:p>
@@ -2388,7 +2386,7 @@
           <a:p>
             <a:fld id="{AED2395A-C272-E84D-AD2E-65B05DB564FF}" type="datetimeFigureOut">
               <a:rPr lang="en-US" smtClean="0"/>
-              <a:t>11/11/21</a:t>
+              <a:t>11/16/2021</a:t>
             </a:fld>
             <a:endParaRPr lang="en-US"/>
           </a:p>
@@ -2676,7 +2674,7 @@
           <a:p>
             <a:fld id="{AED2395A-C272-E84D-AD2E-65B05DB564FF}" type="datetimeFigureOut">
               <a:rPr lang="en-US" smtClean="0"/>
-              <a:t>11/11/21</a:t>
+              <a:t>11/16/2021</a:t>
             </a:fld>
             <a:endParaRPr lang="en-US"/>
           </a:p>
@@ -2917,7 +2915,7 @@
           <a:p>
             <a:fld id="{AED2395A-C272-E84D-AD2E-65B05DB564FF}" type="datetimeFigureOut">
               <a:rPr lang="en-US" smtClean="0"/>
-              <a:t>11/11/21</a:t>
+              <a:t>11/16/2021</a:t>
             </a:fld>
             <a:endParaRPr lang="en-US"/>
           </a:p>
@@ -3824,77 +3822,9 @@
         <p:spPr/>
         <p:txBody>
           <a:bodyPr>
-            <a:normAutofit fontScale="92500"/>
+            <a:normAutofit/>
           </a:bodyPr>
           <a:lstStyle/>
-          <a:p>
-            <a:r>
-              <a:rPr lang="en-US" dirty="0"/>
-              <a:t>Automated scraping/sampling:</a:t>
-            </a:r>
-          </a:p>
-          <a:p>
-            <a:pPr lvl="1"/>
-            <a:r>
-              <a:rPr lang="en-US" dirty="0"/>
-              <a:t>After initial success using a workaround in Python, we ran into further troubles with too many API calls (resulting in the webpage blocking our IP address).</a:t>
-            </a:r>
-          </a:p>
-          <a:p>
-            <a:pPr lvl="1"/>
-            <a:r>
-              <a:rPr lang="en-US" dirty="0"/>
-              <a:t>The website allows access again after a few hours, so a final attempt will be made to scrape the page by pausing the loop after each run. If this attempt is unsuccessful, we will resort fully to OCR/working with a sample of the image files. </a:t>
-            </a:r>
-          </a:p>
-          <a:p>
-            <a:pPr marL="0" indent="0">
-              <a:buNone/>
-            </a:pPr>
-            <a:endParaRPr lang="en-US" dirty="0"/>
-          </a:p>
-          <a:p>
-            <a:r>
-              <a:rPr lang="en-US" dirty="0"/>
-              <a:t>OCR optimization:</a:t>
-            </a:r>
-          </a:p>
-          <a:p>
-            <a:pPr lvl="1"/>
-            <a:r>
-              <a:rPr lang="en-US" dirty="0"/>
-              <a:t>Investigating use of image cropping</a:t>
-            </a:r>
-          </a:p>
-          <a:p>
-            <a:pPr lvl="1"/>
-            <a:r>
-              <a:rPr lang="en-US" dirty="0"/>
-              <a:t>Found a few optimal OCR methods</a:t>
-            </a:r>
-          </a:p>
-          <a:p>
-            <a:pPr lvl="2"/>
-            <a:r>
-              <a:rPr lang="en-US" dirty="0" err="1"/>
-              <a:t>image_modulate</a:t>
-            </a:r>
-            <a:r>
-              <a:rPr lang="en-US" dirty="0"/>
-              <a:t>(), </a:t>
-            </a:r>
-            <a:r>
-              <a:rPr lang="en-US" dirty="0" err="1"/>
-              <a:t>image_noise</a:t>
-            </a:r>
-            <a:r>
-              <a:rPr lang="en-US" dirty="0"/>
-              <a:t>()</a:t>
-            </a:r>
-          </a:p>
-          <a:p>
-            <a:endParaRPr lang="en-US" dirty="0"/>
-          </a:p>
           <a:p>
             <a:endParaRPr lang="en-US" dirty="0"/>
           </a:p>
@@ -3943,7 +3873,7 @@
           <p:cNvPr id="2" name="Title 1">
             <a:extLst>
               <a:ext uri="{FF2B5EF4-FFF2-40B4-BE49-F238E27FC236}">
-                <a16:creationId xmlns:a16="http://schemas.microsoft.com/office/drawing/2014/main" id="{CA5F2AB6-C2ED-5743-A8C9-2C99F511D7B7}"/>
+                <a16:creationId xmlns:a16="http://schemas.microsoft.com/office/drawing/2014/main" id="{4FD1942D-2559-DD45-B87B-38748BFE2C71}"/>
               </a:ext>
             </a:extLst>
           </p:cNvPr>
@@ -3961,7 +3891,7 @@
           <a:p>
             <a:r>
               <a:rPr lang="en-US" dirty="0"/>
-              <a:t>Image Cropping Example</a:t>
+              <a:t>Current Challenges </a:t>
             </a:r>
           </a:p>
         </p:txBody>
@@ -3971,7 +3901,7 @@
           <p:cNvPr id="4" name="Content Placeholder 3">
             <a:extLst>
               <a:ext uri="{FF2B5EF4-FFF2-40B4-BE49-F238E27FC236}">
-                <a16:creationId xmlns:a16="http://schemas.microsoft.com/office/drawing/2014/main" id="{3449436E-F82E-E447-9F04-394F1D2D9279}"/>
+                <a16:creationId xmlns:a16="http://schemas.microsoft.com/office/drawing/2014/main" id="{43F7344E-EF3C-4B1E-BAFB-ADE05440F2B4}"/>
               </a:ext>
             </a:extLst>
           </p:cNvPr>
@@ -3984,8 +3914,8 @@
         </p:nvSpPr>
         <p:spPr>
           <a:xfrm>
-            <a:off x="385713" y="1825624"/>
-            <a:ext cx="10515600" cy="5032375"/>
+            <a:off x="838200" y="1825625"/>
+            <a:ext cx="10515600" cy="4351338"/>
           </a:xfrm>
         </p:spPr>
         <p:txBody>
@@ -3994,314 +3924,14 @@
           </a:bodyPr>
           <a:lstStyle/>
           <a:p>
-            <a:pPr marL="0" indent="0">
-              <a:buNone/>
-            </a:pPr>
-            <a:r>
-              <a:rPr lang="en-US" sz="1600" dirty="0"/>
-              <a:t>EDUCED SF, col REY: ; Cheerios</a:t>
-            </a:r>
-          </a:p>
-          <a:p>
-            <a:pPr marL="0" indent="0">
-              <a:buNone/>
-            </a:pPr>
-            <a:r>
-              <a:rPr lang="en-US" sz="1600" dirty="0" err="1"/>
-              <a:t>Bigtruas</a:t>
-            </a:r>
-            <a:r>
-              <a:rPr lang="en-US" sz="1600" dirty="0"/>
-              <a:t> — 10FBRns psoas GH Fee , </a:t>
-            </a:r>
-            <a:r>
-              <a:rPr lang="en-US" sz="1600" dirty="0" err="1"/>
-              <a:t>ie</a:t>
-            </a:r>
-            <a:r>
-              <a:rPr lang="en-US" sz="1600" dirty="0"/>
-              <a:t> om</a:t>
-            </a:r>
-          </a:p>
-          <a:p>
-            <a:pPr marL="0" indent="0">
-              <a:buNone/>
-            </a:pPr>
-            <a:r>
-              <a:rPr lang="en-US" sz="1600" dirty="0" err="1"/>
-              <a:t>aaa</a:t>
-            </a:r>
-            <a:r>
-              <a:rPr lang="en-US" sz="1600" dirty="0"/>
-              <a:t> . = S EB</a:t>
-            </a:r>
-          </a:p>
-          <a:p>
-            <a:pPr marL="0" indent="0">
-              <a:buNone/>
-            </a:pPr>
-            <a:r>
-              <a:rPr lang="en-US" sz="1600" dirty="0" err="1"/>
-              <a:t>ol</a:t>
-            </a:r>
-            <a:r>
-              <a:rPr lang="en-US" sz="1600" dirty="0"/>
-              <a:t> |g | </a:t>
-            </a:r>
-            <a:r>
-              <a:rPr lang="en-US" sz="1600" dirty="0" err="1"/>
-              <a:t>Ei</a:t>
-            </a:r>
-            <a:r>
-              <a:rPr lang="en-US" sz="1600" dirty="0"/>
-              <a:t> | acre</a:t>
-            </a:r>
-          </a:p>
-          <a:p>
-            <a:pPr marL="0" indent="0">
-              <a:buNone/>
-            </a:pPr>
-            <a:r>
-              <a:rPr lang="en-US" sz="1600" dirty="0" err="1"/>
-              <a:t>sae</a:t>
-            </a:r>
-            <a:r>
-              <a:rPr lang="en-US" sz="1600" dirty="0"/>
-              <a:t> </a:t>
-            </a:r>
-            <a:r>
-              <a:rPr lang="en-US" sz="1600" dirty="0" err="1"/>
-              <a:t>sn</a:t>
-            </a:r>
-            <a:r>
-              <a:rPr lang="en-US" sz="1600" dirty="0"/>
-              <a:t> | j </a:t>
-            </a:r>
-            <a:r>
-              <a:rPr lang="en-US" sz="1600" dirty="0" err="1"/>
-              <a:t>ee</a:t>
-            </a:r>
-            <a:r>
-              <a:rPr lang="en-US" sz="1600" dirty="0"/>
-              <a:t> 5 </a:t>
-            </a:r>
-            <a:r>
-              <a:rPr lang="en-US" sz="1600" dirty="0" err="1"/>
-              <a:t>bie</a:t>
-            </a:r>
-            <a:endParaRPr lang="en-US" sz="1600" dirty="0"/>
-          </a:p>
-          <a:p>
-            <a:pPr marL="0" indent="0">
-              <a:buNone/>
-            </a:pPr>
-            <a:r>
-              <a:rPr lang="en-US" sz="1600" dirty="0">
-                <a:solidFill>
-                  <a:srgbClr val="FF0000"/>
-                </a:solidFill>
-              </a:rPr>
-              <a:t>Old El Paso® 8-10 </a:t>
-            </a:r>
-            <a:r>
-              <a:rPr lang="en-US" sz="1600" dirty="0" err="1">
-                <a:solidFill>
-                  <a:srgbClr val="FF0000"/>
-                </a:solidFill>
-              </a:rPr>
-              <a:t>ct</a:t>
-            </a:r>
-            <a:r>
-              <a:rPr lang="en-US" sz="1600" dirty="0">
-                <a:solidFill>
-                  <a:srgbClr val="FF0000"/>
-                </a:solidFill>
-              </a:rPr>
-              <a:t>: Flour </a:t>
-            </a:r>
-            <a:r>
-              <a:rPr lang="en-US" sz="1600" dirty="0"/>
-              <a:t>Old El Paso® Original Taco Kraft® 7.25 oz. =</a:t>
-            </a:r>
-          </a:p>
-          <a:p>
-            <a:pPr marL="0" indent="0">
-              <a:buNone/>
-            </a:pPr>
-            <a:r>
-              <a:rPr lang="en-US" sz="1600" dirty="0"/>
-              <a:t>; “ </a:t>
-            </a:r>
-            <a:r>
-              <a:rPr lang="en-US" sz="1600" dirty="0" err="1"/>
-              <a:t>ee</a:t>
-            </a:r>
-            <a:r>
-              <a:rPr lang="en-US" sz="1600" dirty="0"/>
-              <a:t> Seasoning, 6.25 oz. Macaroni &amp; Cheese General Mills®</a:t>
-            </a:r>
-          </a:p>
-          <a:p>
-            <a:pPr marL="0" indent="0">
-              <a:buNone/>
-            </a:pPr>
-            <a:r>
-              <a:rPr lang="en-US" sz="1600" dirty="0">
-                <a:solidFill>
-                  <a:srgbClr val="FF0000"/>
-                </a:solidFill>
-              </a:rPr>
-              <a:t>‘SAVE 390, </a:t>
-            </a:r>
-            <a:r>
-              <a:rPr lang="en-US" sz="1600" dirty="0"/>
-              <a:t>SAVE 50% SAVE &gt;: or Cheerios™ Cereal, 8.9 oz.</a:t>
-            </a:r>
-          </a:p>
-          <a:p>
-            <a:pPr marL="0" indent="0">
-              <a:buNone/>
-            </a:pPr>
-            <a:r>
-              <a:rPr lang="en-US" sz="1600" dirty="0"/>
-              <a:t>SAVE °</a:t>
-            </a:r>
-          </a:p>
-          <a:p>
-            <a:pPr marL="0" indent="0">
-              <a:buNone/>
-            </a:pPr>
-            <a:r>
-              <a:rPr lang="en-US" sz="1600" dirty="0"/>
-              <a:t>° 37% 38%</a:t>
-            </a:r>
-          </a:p>
-          <a:p>
-            <a:pPr marL="0" indent="0">
-              <a:buNone/>
-            </a:pPr>
-            <a:r>
-              <a:rPr lang="en-US" sz="1600" dirty="0"/>
-              <a:t>d=</a:t>
-            </a:r>
-          </a:p>
-          <a:p>
-            <a:pPr marL="0" indent="0">
-              <a:buNone/>
-            </a:pPr>
-            <a:r>
-              <a:rPr lang="en-US" sz="1600" dirty="0"/>
-              <a:t>are bd in wee</a:t>
-            </a:r>
-          </a:p>
-          <a:p>
-            <a:pPr marL="0" indent="0">
-              <a:buNone/>
-            </a:pPr>
-            <a:r>
-              <a:rPr lang="en-US" sz="1600" dirty="0" err="1"/>
-              <a:t>ewan</a:t>
-            </a:r>
-            <a:r>
-              <a:rPr lang="en-US" sz="1600" dirty="0"/>
-              <a:t>} SST = of Na.</a:t>
-            </a:r>
-          </a:p>
-          <a:p>
-            <a:pPr marL="0" indent="0">
-              <a:buNone/>
-            </a:pPr>
-            <a:r>
-              <a:rPr lang="en-US" sz="1600" dirty="0">
-                <a:solidFill>
-                  <a:srgbClr val="FF0000"/>
-                </a:solidFill>
-              </a:rPr>
-              <a:t>Where did the “Tortillas, Select Varieties” go?</a:t>
-            </a:r>
-          </a:p>
-        </p:txBody>
-      </p:sp>
-      <p:pic>
-        <p:nvPicPr>
-          <p:cNvPr id="6" name="Picture 5" descr="A picture containing timeline&#10;&#10;Description automatically generated">
-            <a:extLst>
-              <a:ext uri="{FF2B5EF4-FFF2-40B4-BE49-F238E27FC236}">
-                <a16:creationId xmlns:a16="http://schemas.microsoft.com/office/drawing/2014/main" id="{A00B87BE-F2B6-49E3-9E97-0B90F33354EC}"/>
-              </a:ext>
-            </a:extLst>
-          </p:cNvPr>
-          <p:cNvPicPr>
-            <a:picLocks noChangeAspect="1"/>
-          </p:cNvPicPr>
-          <p:nvPr/>
-        </p:nvPicPr>
-        <p:blipFill>
-          <a:blip r:embed="rId2"/>
-          <a:stretch>
-            <a:fillRect/>
-          </a:stretch>
-        </p:blipFill>
-        <p:spPr>
-          <a:xfrm>
-            <a:off x="6892837" y="0"/>
-            <a:ext cx="5299163" cy="6858000"/>
-          </a:xfrm>
-          <a:prstGeom prst="rect">
-            <a:avLst/>
-          </a:prstGeom>
-        </p:spPr>
-      </p:pic>
-      <p:sp>
-        <p:nvSpPr>
-          <p:cNvPr id="8" name="Arrow: Right 7">
-            <a:extLst>
-              <a:ext uri="{FF2B5EF4-FFF2-40B4-BE49-F238E27FC236}">
-                <a16:creationId xmlns:a16="http://schemas.microsoft.com/office/drawing/2014/main" id="{AD281F14-3E00-4C80-8FC7-AB896A9C9528}"/>
-              </a:ext>
-            </a:extLst>
-          </p:cNvPr>
-          <p:cNvSpPr/>
-          <p:nvPr/>
-        </p:nvSpPr>
-        <p:spPr>
-          <a:xfrm>
-            <a:off x="5901179" y="1690688"/>
-            <a:ext cx="1376314" cy="1005378"/>
-          </a:xfrm>
-          <a:prstGeom prst="rightArrow">
-            <a:avLst/>
-          </a:prstGeom>
-        </p:spPr>
-        <p:style>
-          <a:lnRef idx="2">
-            <a:schemeClr val="accent2">
-              <a:shade val="50000"/>
-            </a:schemeClr>
-          </a:lnRef>
-          <a:fillRef idx="1">
-            <a:schemeClr val="accent2"/>
-          </a:fillRef>
-          <a:effectRef idx="0">
-            <a:schemeClr val="accent2"/>
-          </a:effectRef>
-          <a:fontRef idx="minor">
-            <a:schemeClr val="lt1"/>
-          </a:fontRef>
-        </p:style>
-        <p:txBody>
-          <a:bodyPr rtlCol="0" anchor="ctr"/>
-          <a:lstStyle/>
-          <a:p>
-            <a:pPr algn="ctr"/>
-            <a:endParaRPr lang="en-US"/>
+            <a:endParaRPr lang="en-US" dirty="0"/>
           </a:p>
         </p:txBody>
       </p:sp>
     </p:spTree>
     <p:extLst>
       <p:ext uri="{BB962C8B-B14F-4D97-AF65-F5344CB8AC3E}">
-        <p14:creationId xmlns:p14="http://schemas.microsoft.com/office/powerpoint/2010/main" val="3044469165"/>
+        <p14:creationId xmlns:p14="http://schemas.microsoft.com/office/powerpoint/2010/main" val="3681003705"/>
       </p:ext>
     </p:extLst>
   </p:cSld>
@@ -4341,390 +3971,6 @@
           <p:cNvPr id="2" name="Title 1">
             <a:extLst>
               <a:ext uri="{FF2B5EF4-FFF2-40B4-BE49-F238E27FC236}">
-                <a16:creationId xmlns:a16="http://schemas.microsoft.com/office/drawing/2014/main" id="{CA5F2AB6-C2ED-5743-A8C9-2C99F511D7B7}"/>
-              </a:ext>
-            </a:extLst>
-          </p:cNvPr>
-          <p:cNvSpPr>
-            <a:spLocks noGrp="1"/>
-          </p:cNvSpPr>
-          <p:nvPr>
-            <p:ph type="title"/>
-          </p:nvPr>
-        </p:nvSpPr>
-        <p:spPr/>
-        <p:txBody>
-          <a:bodyPr/>
-          <a:lstStyle/>
-          <a:p>
-            <a:r>
-              <a:rPr lang="en-US" dirty="0"/>
-              <a:t>Image Cropping Example</a:t>
-            </a:r>
-          </a:p>
-        </p:txBody>
-      </p:sp>
-      <p:sp>
-        <p:nvSpPr>
-          <p:cNvPr id="4" name="Content Placeholder 3">
-            <a:extLst>
-              <a:ext uri="{FF2B5EF4-FFF2-40B4-BE49-F238E27FC236}">
-                <a16:creationId xmlns:a16="http://schemas.microsoft.com/office/drawing/2014/main" id="{3449436E-F82E-E447-9F04-394F1D2D9279}"/>
-              </a:ext>
-            </a:extLst>
-          </p:cNvPr>
-          <p:cNvSpPr>
-            <a:spLocks noGrp="1"/>
-          </p:cNvSpPr>
-          <p:nvPr>
-            <p:ph idx="1"/>
-          </p:nvPr>
-        </p:nvSpPr>
-        <p:spPr/>
-        <p:txBody>
-          <a:bodyPr>
-            <a:normAutofit lnSpcReduction="10000"/>
-          </a:bodyPr>
-          <a:lstStyle/>
-          <a:p>
-            <a:pPr marL="0" indent="0">
-              <a:buNone/>
-            </a:pPr>
-            <a:r>
-              <a:rPr lang="en-US" sz="2000" dirty="0"/>
-              <a:t>a1 &lt;- </a:t>
-            </a:r>
-            <a:r>
-              <a:rPr lang="en-US" sz="2000" dirty="0" err="1"/>
-              <a:t>image_crop</a:t>
-            </a:r>
-            <a:r>
-              <a:rPr lang="en-US" sz="2000" dirty="0"/>
-              <a:t>(</a:t>
-            </a:r>
-            <a:r>
-              <a:rPr lang="en-US" sz="2000" dirty="0" err="1"/>
-              <a:t>ad_test</a:t>
-            </a:r>
-            <a:r>
-              <a:rPr lang="en-US" sz="2000" dirty="0"/>
-              <a:t>, geometry = </a:t>
-            </a:r>
-            <a:r>
-              <a:rPr lang="en-US" sz="2000" dirty="0" err="1"/>
-              <a:t>geometry_area</a:t>
-            </a:r>
-            <a:r>
-              <a:rPr lang="en-US" sz="2000" dirty="0"/>
-              <a:t>(width = 300,</a:t>
-            </a:r>
-          </a:p>
-          <a:p>
-            <a:pPr marL="0" indent="0">
-              <a:buNone/>
-            </a:pPr>
-            <a:r>
-              <a:rPr lang="en-US" sz="2000" dirty="0"/>
-              <a:t>				   	                   height = 150,</a:t>
-            </a:r>
-          </a:p>
-          <a:p>
-            <a:pPr marL="0" indent="0">
-              <a:buNone/>
-            </a:pPr>
-            <a:r>
-              <a:rPr lang="en-US" sz="2000" dirty="0"/>
-              <a:t>	             					   </a:t>
-            </a:r>
-            <a:r>
-              <a:rPr lang="en-US" sz="2000" dirty="0" err="1"/>
-              <a:t>x_off</a:t>
-            </a:r>
-            <a:r>
-              <a:rPr lang="en-US" sz="2000" dirty="0"/>
-              <a:t> = 50,</a:t>
-            </a:r>
-          </a:p>
-          <a:p>
-            <a:pPr marL="0" indent="0">
-              <a:buNone/>
-            </a:pPr>
-            <a:r>
-              <a:rPr lang="en-US" sz="2000" dirty="0"/>
-              <a:t>	             					   </a:t>
-            </a:r>
-            <a:r>
-              <a:rPr lang="en-US" sz="2000" dirty="0" err="1"/>
-              <a:t>y_off</a:t>
-            </a:r>
-            <a:r>
-              <a:rPr lang="en-US" sz="2000" dirty="0"/>
-              <a:t> = 590))</a:t>
-            </a:r>
-          </a:p>
-          <a:p>
-            <a:pPr marL="0" indent="0">
-              <a:buNone/>
-            </a:pPr>
-            <a:r>
-              <a:rPr lang="en-US" sz="2000" dirty="0"/>
-              <a:t>text_a1 &lt;- </a:t>
-            </a:r>
-            <a:r>
-              <a:rPr lang="en-US" sz="2000" dirty="0" err="1"/>
-              <a:t>ocr</a:t>
-            </a:r>
-            <a:r>
-              <a:rPr lang="en-US" sz="2000" dirty="0"/>
-              <a:t>(a1)</a:t>
-            </a:r>
-          </a:p>
-          <a:p>
-            <a:pPr marL="0" indent="0">
-              <a:buNone/>
-            </a:pPr>
-            <a:r>
-              <a:rPr lang="en-US" sz="2000" dirty="0"/>
-              <a:t>cat(text_a1)</a:t>
-            </a:r>
-          </a:p>
-          <a:p>
-            <a:pPr marL="0" indent="0">
-              <a:buNone/>
-            </a:pPr>
-            <a:endParaRPr lang="en-US" sz="2000" dirty="0"/>
-          </a:p>
-          <a:p>
-            <a:pPr marL="0" indent="0">
-              <a:buNone/>
-            </a:pPr>
-            <a:r>
-              <a:rPr lang="en-US" sz="2000" dirty="0"/>
-              <a:t>Old El Paso® 8 - 10 ct. Flour</a:t>
-            </a:r>
-          </a:p>
-          <a:p>
-            <a:pPr marL="0" indent="0">
-              <a:buNone/>
-            </a:pPr>
-            <a:r>
-              <a:rPr lang="en-US" sz="2000" dirty="0"/>
-              <a:t>Tortillas, Select Varieties</a:t>
-            </a:r>
-          </a:p>
-          <a:p>
-            <a:pPr marL="0" indent="0">
-              <a:buNone/>
-            </a:pPr>
-            <a:r>
-              <a:rPr lang="en-US" sz="2000" dirty="0"/>
-              <a:t>SAVE 9</a:t>
-            </a:r>
-          </a:p>
-          <a:p>
-            <a:pPr marL="0" indent="0">
-              <a:buNone/>
-            </a:pPr>
-            <a:r>
-              <a:rPr lang="en-US" sz="2000" dirty="0"/>
-              <a:t>39%</a:t>
-            </a:r>
-          </a:p>
-          <a:p>
-            <a:endParaRPr lang="en-US" dirty="0"/>
-          </a:p>
-        </p:txBody>
-      </p:sp>
-      <p:pic>
-        <p:nvPicPr>
-          <p:cNvPr id="1026" name="Picture 2">
-            <a:extLst>
-              <a:ext uri="{FF2B5EF4-FFF2-40B4-BE49-F238E27FC236}">
-                <a16:creationId xmlns:a16="http://schemas.microsoft.com/office/drawing/2014/main" id="{9ADD88EB-E98F-466A-8492-158C488543DA}"/>
-              </a:ext>
-            </a:extLst>
-          </p:cNvPr>
-          <p:cNvPicPr>
-            <a:picLocks noChangeAspect="1" noChangeArrowheads="1"/>
-          </p:cNvPicPr>
-          <p:nvPr/>
-        </p:nvPicPr>
-        <p:blipFill>
-          <a:blip r:embed="rId2">
-            <a:extLst>
-              <a:ext uri="{28A0092B-C50C-407E-A947-70E740481C1C}">
-                <a14:useLocalDpi xmlns:a14="http://schemas.microsoft.com/office/drawing/2010/main" val="0"/>
-              </a:ext>
-            </a:extLst>
-          </a:blip>
-          <a:srcRect/>
-          <a:stretch>
-            <a:fillRect/>
-          </a:stretch>
-        </p:blipFill>
-        <p:spPr bwMode="auto">
-          <a:xfrm>
-            <a:off x="8635935" y="1825625"/>
-            <a:ext cx="2857500" cy="1428750"/>
-          </a:xfrm>
-          <a:prstGeom prst="rect">
-            <a:avLst/>
-          </a:prstGeom>
-          <a:noFill/>
-          <a:extLst>
-            <a:ext uri="{909E8E84-426E-40DD-AFC4-6F175D3DCCD1}">
-              <a14:hiddenFill xmlns:a14="http://schemas.microsoft.com/office/drawing/2010/main">
-                <a:solidFill>
-                  <a:srgbClr val="FFFFFF"/>
-                </a:solidFill>
-              </a14:hiddenFill>
-            </a:ext>
-          </a:extLst>
-        </p:spPr>
-      </p:pic>
-    </p:spTree>
-    <p:extLst>
-      <p:ext uri="{BB962C8B-B14F-4D97-AF65-F5344CB8AC3E}">
-        <p14:creationId xmlns:p14="http://schemas.microsoft.com/office/powerpoint/2010/main" val="2996974391"/>
-      </p:ext>
-    </p:extLst>
-  </p:cSld>
-  <p:clrMapOvr>
-    <a:masterClrMapping/>
-  </p:clrMapOvr>
-</p:sld>
-</file>
-
-<file path=ppt/slides/slide7.xml><?xml version="1.0" encoding="utf-8"?>
-<p:sld xmlns:a="http://schemas.openxmlformats.org/drawingml/2006/main" xmlns:r="http://schemas.openxmlformats.org/officeDocument/2006/relationships" xmlns:p="http://schemas.openxmlformats.org/presentationml/2006/main">
-  <p:cSld>
-    <p:bg>
-      <p:bgPr>
-        <a:solidFill>
-          <a:schemeClr val="bg2"/>
-        </a:solidFill>
-        <a:effectLst/>
-      </p:bgPr>
-    </p:bg>
-    <p:spTree>
-      <p:nvGrpSpPr>
-        <p:cNvPr id="1" name=""/>
-        <p:cNvGrpSpPr/>
-        <p:nvPr/>
-      </p:nvGrpSpPr>
-      <p:grpSpPr>
-        <a:xfrm>
-          <a:off x="0" y="0"/>
-          <a:ext cx="0" cy="0"/>
-          <a:chOff x="0" y="0"/>
-          <a:chExt cx="0" cy="0"/>
-        </a:xfrm>
-      </p:grpSpPr>
-      <p:sp>
-        <p:nvSpPr>
-          <p:cNvPr id="2" name="Title 1">
-            <a:extLst>
-              <a:ext uri="{FF2B5EF4-FFF2-40B4-BE49-F238E27FC236}">
-                <a16:creationId xmlns:a16="http://schemas.microsoft.com/office/drawing/2014/main" id="{4FD1942D-2559-DD45-B87B-38748BFE2C71}"/>
-              </a:ext>
-            </a:extLst>
-          </p:cNvPr>
-          <p:cNvSpPr>
-            <a:spLocks noGrp="1"/>
-          </p:cNvSpPr>
-          <p:nvPr>
-            <p:ph type="title"/>
-          </p:nvPr>
-        </p:nvSpPr>
-        <p:spPr/>
-        <p:txBody>
-          <a:bodyPr/>
-          <a:lstStyle/>
-          <a:p>
-            <a:r>
-              <a:rPr lang="en-US" dirty="0"/>
-              <a:t>Current Challenges </a:t>
-            </a:r>
-          </a:p>
-        </p:txBody>
-      </p:sp>
-      <p:sp>
-        <p:nvSpPr>
-          <p:cNvPr id="3" name="Content Placeholder 2">
-            <a:extLst>
-              <a:ext uri="{FF2B5EF4-FFF2-40B4-BE49-F238E27FC236}">
-                <a16:creationId xmlns:a16="http://schemas.microsoft.com/office/drawing/2014/main" id="{580C7FDC-262C-AF45-A868-6023771F1225}"/>
-              </a:ext>
-            </a:extLst>
-          </p:cNvPr>
-          <p:cNvSpPr>
-            <a:spLocks noGrp="1"/>
-          </p:cNvSpPr>
-          <p:nvPr>
-            <p:ph idx="1"/>
-          </p:nvPr>
-        </p:nvSpPr>
-        <p:spPr/>
-        <p:txBody>
-          <a:bodyPr/>
-          <a:lstStyle/>
-          <a:p>
-            <a:r>
-              <a:rPr lang="en-US" dirty="0"/>
-              <a:t>Webpage blocks our IP address for several hours after scraping attempt.</a:t>
-            </a:r>
-          </a:p>
-          <a:p>
-            <a:r>
-              <a:rPr lang="en-US" dirty="0"/>
-              <a:t>Image cropping has proved difficult (but not impossible) due to the inconsistency between ad pages.</a:t>
-            </a:r>
-          </a:p>
-        </p:txBody>
-      </p:sp>
-    </p:spTree>
-    <p:extLst>
-      <p:ext uri="{BB962C8B-B14F-4D97-AF65-F5344CB8AC3E}">
-        <p14:creationId xmlns:p14="http://schemas.microsoft.com/office/powerpoint/2010/main" val="3681003705"/>
-      </p:ext>
-    </p:extLst>
-  </p:cSld>
-  <p:clrMapOvr>
-    <a:masterClrMapping/>
-  </p:clrMapOvr>
-</p:sld>
-</file>
-
-<file path=ppt/slides/slide8.xml><?xml version="1.0" encoding="utf-8"?>
-<p:sld xmlns:a="http://schemas.openxmlformats.org/drawingml/2006/main" xmlns:r="http://schemas.openxmlformats.org/officeDocument/2006/relationships" xmlns:p="http://schemas.openxmlformats.org/presentationml/2006/main">
-  <p:cSld>
-    <p:bg>
-      <p:bgPr>
-        <a:solidFill>
-          <a:schemeClr val="bg2"/>
-        </a:solidFill>
-        <a:effectLst/>
-      </p:bgPr>
-    </p:bg>
-    <p:spTree>
-      <p:nvGrpSpPr>
-        <p:cNvPr id="1" name=""/>
-        <p:cNvGrpSpPr/>
-        <p:nvPr/>
-      </p:nvGrpSpPr>
-      <p:grpSpPr>
-        <a:xfrm>
-          <a:off x="0" y="0"/>
-          <a:ext cx="0" cy="0"/>
-          <a:chOff x="0" y="0"/>
-          <a:chExt cx="0" cy="0"/>
-        </a:xfrm>
-      </p:grpSpPr>
-      <p:sp>
-        <p:nvSpPr>
-          <p:cNvPr id="2" name="Title 1">
-            <a:extLst>
-              <a:ext uri="{FF2B5EF4-FFF2-40B4-BE49-F238E27FC236}">
                 <a16:creationId xmlns:a16="http://schemas.microsoft.com/office/drawing/2014/main" id="{7AC5DE2A-6150-2E4E-9595-649FBF64DF5C}"/>
               </a:ext>
             </a:extLst>
@@ -4769,29 +4015,7 @@
           <a:bodyPr/>
           <a:lstStyle/>
           <a:p>
-            <a:r>
-              <a:rPr lang="en-US" dirty="0"/>
-              <a:t>Attempt to scrape the webpage a final time by pausing the system in between iterations.</a:t>
-            </a:r>
-          </a:p>
-          <a:p>
-            <a:r>
-              <a:rPr lang="en-US" dirty="0"/>
-              <a:t>If this fails, grab a sample of image files from October – December of each year.</a:t>
-            </a:r>
-          </a:p>
-          <a:p>
-            <a:pPr lvl="1"/>
-            <a:r>
-              <a:rPr lang="en-US" dirty="0"/>
-              <a:t>Look at holiday trends</a:t>
-            </a:r>
-          </a:p>
-          <a:p>
-            <a:r>
-              <a:rPr lang="en-US" dirty="0"/>
-              <a:t>Improve image cropping to locate correct elements of the image files.</a:t>
-            </a:r>
+            <a:endParaRPr lang="en-US" dirty="0"/>
           </a:p>
         </p:txBody>
       </p:sp>
@@ -4808,7 +4032,7 @@
 </p:sld>
 </file>
 
-<file path=ppt/slides/slide9.xml><?xml version="1.0" encoding="utf-8"?>
+<file path=ppt/slides/slide7.xml><?xml version="1.0" encoding="utf-8"?>
 <p:sld xmlns:a="http://schemas.openxmlformats.org/drawingml/2006/main" xmlns:r="http://schemas.openxmlformats.org/officeDocument/2006/relationships" xmlns:p="http://schemas.openxmlformats.org/presentationml/2006/main">
   <p:cSld>
     <p:bg>

</xml_diff>